<commit_message>
Adição de vários arquivos e projeto do Eclipse
Projeto do Eclipse contendo o DCB
</commit_message>
<xml_diff>
--- a/Semanais TCC encontro 3.pptx
+++ b/Semanais TCC encontro 3.pptx
@@ -3866,8 +3866,93 @@
                   <a:srgbClr val="000000"/>
                 </a:solidFill>
               </a:rPr>
-              <a:t> </a:t>
-            </a:r>
+              <a:t>O que vai ser preciso para criar as mensagens nulas</a:t>
+            </a:r>
+          </a:p>
+          <a:p>
+            <a:pPr>
+              <a:buFont typeface="Arial"/>
+              <a:buChar char="•"/>
+            </a:pPr>
+            <a:r>
+              <a:rPr lang="pt-BR" dirty="0">
+                <a:solidFill>
+                  <a:srgbClr val="000000"/>
+                </a:solidFill>
+              </a:rPr>
+              <a:t>Utilizar a média de envio das mensagens da aplicação para calcular a promessa</a:t>
+            </a:r>
+          </a:p>
+          <a:p>
+            <a:pPr>
+              <a:buFont typeface="Arial"/>
+              <a:buChar char="•"/>
+            </a:pPr>
+            <a:r>
+              <a:rPr lang="pt-BR" dirty="0">
+                <a:solidFill>
+                  <a:srgbClr val="000000"/>
+                </a:solidFill>
+              </a:rPr>
+              <a:t>Criar </a:t>
+            </a:r>
+            <a:r>
+              <a:rPr lang="pt-BR" dirty="0" err="1">
+                <a:solidFill>
+                  <a:srgbClr val="000000"/>
+                </a:solidFill>
+              </a:rPr>
+              <a:t>pseudoAlgoritmo</a:t>
+            </a:r>
+            <a:r>
+              <a:rPr lang="pt-BR" dirty="0">
+                <a:solidFill>
+                  <a:srgbClr val="000000"/>
+                </a:solidFill>
+              </a:rPr>
+              <a:t> do envio das mensagens nulas e da média das mensagens. </a:t>
+            </a:r>
+          </a:p>
+          <a:p>
+            <a:pPr>
+              <a:buFont typeface="Arial"/>
+              <a:buChar char="•"/>
+            </a:pPr>
+            <a:r>
+              <a:rPr lang="pt-BR" dirty="0">
+                <a:solidFill>
+                  <a:srgbClr val="000000"/>
+                </a:solidFill>
+              </a:rPr>
+              <a:t>Verificar a possibilidade de realizar o cálculo do checkpoint sem a utilização da mensagem nula</a:t>
+            </a:r>
+          </a:p>
+          <a:p>
+            <a:pPr>
+              <a:buFont typeface="Arial"/>
+              <a:buChar char="•"/>
+            </a:pPr>
+            <a:r>
+              <a:rPr lang="pt-BR" dirty="0">
+                <a:solidFill>
+                  <a:srgbClr val="000000"/>
+                </a:solidFill>
+              </a:rPr>
+              <a:t>DCB tem que criar tudo, aplicação apenas faz </a:t>
+            </a:r>
+            <a:r>
+              <a:rPr lang="pt-BR">
+                <a:solidFill>
+                  <a:srgbClr val="000000"/>
+                </a:solidFill>
+              </a:rPr>
+              <a:t>operações internas. </a:t>
+            </a:r>
+            <a:endParaRPr lang="pt-BR" dirty="0">
+              <a:solidFill>
+                <a:srgbClr val="000000"/>
+              </a:solidFill>
+            </a:endParaRPr>
           </a:p>
         </p:txBody>
       </p:sp>

</xml_diff>